<commit_message>
add new files and organize
</commit_message>
<xml_diff>
--- a/NET Conf AR 2018/NET Conf AR v2018 Infrastructure as Code on Azure.pptx
+++ b/NET Conf AR 2018/NET Conf AR v2018 Infrastructure as Code on Azure.pptx
@@ -6,7 +6,7 @@
     <p:sldMasterId id="2147483670" r:id="rId2"/>
   </p:sldMasterIdLst>
   <p:notesMasterIdLst>
-    <p:notesMasterId r:id="rId34"/>
+    <p:notesMasterId r:id="rId35"/>
   </p:notesMasterIdLst>
   <p:sldIdLst>
     <p:sldId id="256" r:id="rId3"/>
@@ -30,16 +30,17 @@
     <p:sldId id="305" r:id="rId21"/>
     <p:sldId id="293" r:id="rId22"/>
     <p:sldId id="309" r:id="rId23"/>
-    <p:sldId id="317" r:id="rId24"/>
-    <p:sldId id="310" r:id="rId25"/>
-    <p:sldId id="312" r:id="rId26"/>
-    <p:sldId id="311" r:id="rId27"/>
-    <p:sldId id="314" r:id="rId28"/>
-    <p:sldId id="315" r:id="rId29"/>
-    <p:sldId id="316" r:id="rId30"/>
-    <p:sldId id="313" r:id="rId31"/>
-    <p:sldId id="297" r:id="rId32"/>
-    <p:sldId id="258" r:id="rId33"/>
+    <p:sldId id="318" r:id="rId24"/>
+    <p:sldId id="317" r:id="rId25"/>
+    <p:sldId id="310" r:id="rId26"/>
+    <p:sldId id="312" r:id="rId27"/>
+    <p:sldId id="311" r:id="rId28"/>
+    <p:sldId id="314" r:id="rId29"/>
+    <p:sldId id="315" r:id="rId30"/>
+    <p:sldId id="316" r:id="rId31"/>
+    <p:sldId id="313" r:id="rId32"/>
+    <p:sldId id="297" r:id="rId33"/>
+    <p:sldId id="258" r:id="rId34"/>
   </p:sldIdLst>
   <p:sldSz cx="12192000" cy="6858000"/>
   <p:notesSz cx="6858000" cy="9144000"/>
@@ -5034,7 +5035,7 @@
           <a:p>
             <a:fld id="{1F02952A-5A15-1543-A89E-A6E142AB7825}" type="datetimeFigureOut">
               <a:rPr lang="en-US" smtClean="0"/>
-              <a:t>11/8/2018</a:t>
+              <a:t>11/14/2018</a:t>
             </a:fld>
             <a:endParaRPr lang="en-US"/>
           </a:p>
@@ -5597,6 +5598,208 @@
     </p:spTree>
     <p:extLst>
       <p:ext uri="{BB962C8B-B14F-4D97-AF65-F5344CB8AC3E}">
+        <p14:creationId xmlns:p14="http://schemas.microsoft.com/office/powerpoint/2010/main" val="3195424488"/>
+      </p:ext>
+    </p:extLst>
+  </p:cSld>
+  <p:clrMapOvr>
+    <a:masterClrMapping/>
+  </p:clrMapOvr>
+</p:notes>
+</file>
+
+<file path=ppt/notesSlides/notesSlide11.xml><?xml version="1.0" encoding="utf-8"?>
+<p:notes xmlns:a="http://schemas.openxmlformats.org/drawingml/2006/main" xmlns:r="http://schemas.openxmlformats.org/officeDocument/2006/relationships" xmlns:p="http://schemas.openxmlformats.org/presentationml/2006/main">
+  <p:cSld>
+    <p:spTree>
+      <p:nvGrpSpPr>
+        <p:cNvPr id="1" name=""/>
+        <p:cNvGrpSpPr/>
+        <p:nvPr/>
+      </p:nvGrpSpPr>
+      <p:grpSpPr>
+        <a:xfrm>
+          <a:off x="0" y="0"/>
+          <a:ext cx="0" cy="0"/>
+          <a:chOff x="0" y="0"/>
+          <a:chExt cx="0" cy="0"/>
+        </a:xfrm>
+      </p:grpSpPr>
+      <p:sp>
+        <p:nvSpPr>
+          <p:cNvPr id="2" name="Slide Image Placeholder 1"/>
+          <p:cNvSpPr>
+            <a:spLocks noGrp="1" noRot="1" noChangeAspect="1"/>
+          </p:cNvSpPr>
+          <p:nvPr>
+            <p:ph type="sldImg"/>
+          </p:nvPr>
+        </p:nvSpPr>
+        <p:spPr/>
+      </p:sp>
+      <p:sp>
+        <p:nvSpPr>
+          <p:cNvPr id="3" name="Notes Placeholder 2"/>
+          <p:cNvSpPr>
+            <a:spLocks noGrp="1"/>
+          </p:cNvSpPr>
+          <p:nvPr>
+            <p:ph type="body" idx="1"/>
+          </p:nvPr>
+        </p:nvSpPr>
+        <p:spPr/>
+        <p:txBody>
+          <a:bodyPr/>
+          <a:lstStyle/>
+          <a:p>
+            <a:pPr marL="0" lvl="0" indent="0">
+              <a:spcBef>
+                <a:spcPts val="0"/>
+              </a:spcBef>
+              <a:spcAft>
+                <a:spcPts val="0"/>
+              </a:spcAft>
+              <a:buNone/>
+            </a:pPr>
+            <a:r>
+              <a:rPr lang="es-ES" sz="1200" b="0" i="0" u="none" strike="noStrike" cap="none" dirty="0">
+                <a:solidFill>
+                  <a:schemeClr val="dk1"/>
+                </a:solidFill>
+                <a:effectLst/>
+                <a:latin typeface="Nunito"/>
+                <a:ea typeface="Nunito"/>
+                <a:cs typeface="Nunito"/>
+                <a:sym typeface="Nunito"/>
+              </a:rPr>
+              <a:t>Los </a:t>
+            </a:r>
+            <a:r>
+              <a:rPr lang="es-ES" sz="1200" b="0" i="0" u="none" strike="noStrike" cap="none" dirty="0" err="1">
+                <a:solidFill>
+                  <a:schemeClr val="dk1"/>
+                </a:solidFill>
+                <a:effectLst/>
+                <a:latin typeface="Nunito"/>
+                <a:ea typeface="Nunito"/>
+                <a:cs typeface="Nunito"/>
+                <a:sym typeface="Nunito"/>
+              </a:rPr>
+              <a:t>Runbooks</a:t>
+            </a:r>
+            <a:r>
+              <a:rPr lang="es-ES" sz="1200" b="0" i="0" u="none" strike="noStrike" cap="none" dirty="0">
+                <a:solidFill>
+                  <a:schemeClr val="dk1"/>
+                </a:solidFill>
+                <a:effectLst/>
+                <a:latin typeface="Nunito"/>
+                <a:ea typeface="Nunito"/>
+                <a:cs typeface="Nunito"/>
+                <a:sym typeface="Nunito"/>
+              </a:rPr>
+              <a:t> permiten controlar la creación, implementación, supervisión y el mantenimiento de los recursos en Azure y aplicaciones externas. También permiten controlar la ejecución de los mismos, dejando a disposición la posibilidad de ejecutar los </a:t>
+            </a:r>
+            <a:r>
+              <a:rPr lang="es-ES" sz="1200" b="0" i="0" u="none" strike="noStrike" cap="none" dirty="0" err="1">
+                <a:solidFill>
+                  <a:schemeClr val="dk1"/>
+                </a:solidFill>
+                <a:effectLst/>
+                <a:latin typeface="Nunito"/>
+                <a:ea typeface="Nunito"/>
+                <a:cs typeface="Nunito"/>
+                <a:sym typeface="Nunito"/>
+              </a:rPr>
+              <a:t>Runbooks</a:t>
+            </a:r>
+            <a:r>
+              <a:rPr lang="es-ES" sz="1200" b="0" i="0" u="none" strike="noStrike" cap="none" dirty="0">
+                <a:solidFill>
+                  <a:schemeClr val="dk1"/>
+                </a:solidFill>
+                <a:effectLst/>
+                <a:latin typeface="Nunito"/>
+                <a:ea typeface="Nunito"/>
+                <a:cs typeface="Nunito"/>
+                <a:sym typeface="Nunito"/>
+              </a:rPr>
+              <a:t> de forma programada.</a:t>
+            </a:r>
+          </a:p>
+          <a:p>
+            <a:pPr marL="0" lvl="0" indent="0">
+              <a:spcBef>
+                <a:spcPts val="0"/>
+              </a:spcBef>
+              <a:spcAft>
+                <a:spcPts val="0"/>
+              </a:spcAft>
+              <a:buNone/>
+            </a:pPr>
+            <a:r>
+              <a:rPr lang="es-ES" sz="1200" b="0" i="0" u="none" strike="noStrike" cap="none" dirty="0">
+                <a:solidFill>
+                  <a:schemeClr val="dk1"/>
+                </a:solidFill>
+                <a:effectLst/>
+                <a:latin typeface="Nunito"/>
+                <a:sym typeface="Nunito"/>
+              </a:rPr>
+              <a:t>Galería de </a:t>
+            </a:r>
+            <a:r>
+              <a:rPr lang="es-ES" sz="1200" b="0" i="0" u="none" strike="noStrike" cap="none" dirty="0" err="1">
+                <a:solidFill>
+                  <a:schemeClr val="dk1"/>
+                </a:solidFill>
+                <a:effectLst/>
+                <a:latin typeface="Nunito"/>
+                <a:sym typeface="Nunito"/>
+              </a:rPr>
+              <a:t>Runbooks</a:t>
+            </a:r>
+            <a:r>
+              <a:rPr lang="es-ES" sz="1200" b="0" i="0" u="none" strike="noStrike" cap="none" dirty="0">
+                <a:solidFill>
+                  <a:schemeClr val="dk1"/>
+                </a:solidFill>
+                <a:effectLst/>
+                <a:latin typeface="Nunito"/>
+                <a:sym typeface="Nunito"/>
+              </a:rPr>
+              <a:t> alimentado por la comunidad.</a:t>
+            </a:r>
+            <a:endParaRPr lang="es-ES" dirty="0"/>
+          </a:p>
+        </p:txBody>
+      </p:sp>
+      <p:sp>
+        <p:nvSpPr>
+          <p:cNvPr id="4" name="Slide Number Placeholder 3"/>
+          <p:cNvSpPr>
+            <a:spLocks noGrp="1"/>
+          </p:cNvSpPr>
+          <p:nvPr>
+            <p:ph type="sldNum" sz="quarter" idx="5"/>
+          </p:nvPr>
+        </p:nvSpPr>
+        <p:spPr/>
+        <p:txBody>
+          <a:bodyPr/>
+          <a:lstStyle/>
+          <a:p>
+            <a:fld id="{034BFA8B-862A-E743-A9E6-9B9C0E234B15}" type="slidenum">
+              <a:rPr lang="en-US" smtClean="0"/>
+              <a:t>29</a:t>
+            </a:fld>
+            <a:endParaRPr lang="en-US"/>
+          </a:p>
+        </p:txBody>
+      </p:sp>
+    </p:spTree>
+    <p:extLst>
+      <p:ext uri="{BB962C8B-B14F-4D97-AF65-F5344CB8AC3E}">
         <p14:creationId xmlns:p14="http://schemas.microsoft.com/office/powerpoint/2010/main" val="4250076936"/>
       </p:ext>
     </p:extLst>
@@ -6201,7 +6404,7 @@
           <a:p>
             <a:fld id="{034BFA8B-862A-E743-A9E6-9B9C0E234B15}" type="slidenum">
               <a:rPr lang="en-US" smtClean="0"/>
-              <a:t>23</a:t>
+              <a:t>22</a:t>
             </a:fld>
             <a:endParaRPr lang="en-US"/>
           </a:p>
@@ -6210,7 +6413,7 @@
     </p:spTree>
     <p:extLst>
       <p:ext uri="{BB962C8B-B14F-4D97-AF65-F5344CB8AC3E}">
-        <p14:creationId xmlns:p14="http://schemas.microsoft.com/office/powerpoint/2010/main" val="2851905238"/>
+        <p14:creationId xmlns:p14="http://schemas.microsoft.com/office/powerpoint/2010/main" val="1155025195"/>
       </p:ext>
     </p:extLst>
   </p:cSld>
@@ -6315,7 +6518,7 @@
     </p:spTree>
     <p:extLst>
       <p:ext uri="{BB962C8B-B14F-4D97-AF65-F5344CB8AC3E}">
-        <p14:creationId xmlns:p14="http://schemas.microsoft.com/office/powerpoint/2010/main" val="3360137030"/>
+        <p14:creationId xmlns:p14="http://schemas.microsoft.com/office/powerpoint/2010/main" val="2851905238"/>
       </p:ext>
     </p:extLst>
   </p:cSld>
@@ -6420,7 +6623,7 @@
     </p:spTree>
     <p:extLst>
       <p:ext uri="{BB962C8B-B14F-4D97-AF65-F5344CB8AC3E}">
-        <p14:creationId xmlns:p14="http://schemas.microsoft.com/office/powerpoint/2010/main" val="4190936145"/>
+        <p14:creationId xmlns:p14="http://schemas.microsoft.com/office/powerpoint/2010/main" val="3360137030"/>
       </p:ext>
     </p:extLst>
   </p:cSld>
@@ -6474,125 +6677,28 @@
           <a:bodyPr/>
           <a:lstStyle/>
           <a:p>
-            <a:pPr marL="0" lvl="0" indent="0">
+            <a:pPr marL="0" marR="0" lvl="0" indent="0" algn="l" defTabSz="914400" rtl="0" eaLnBrk="1" fontAlgn="auto" latinLnBrk="0" hangingPunct="1">
+              <a:lnSpc>
+                <a:spcPct val="100000"/>
+              </a:lnSpc>
               <a:spcBef>
                 <a:spcPts val="0"/>
               </a:spcBef>
               <a:spcAft>
                 <a:spcPts val="0"/>
               </a:spcAft>
+              <a:buClrTx/>
+              <a:buSzTx/>
+              <a:buFontTx/>
               <a:buNone/>
+              <a:tabLst/>
+              <a:defRPr/>
             </a:pPr>
             <a:r>
-              <a:rPr lang="es-ES" sz="1200" b="0" i="0" u="none" strike="noStrike" cap="none" dirty="0">
-                <a:solidFill>
-                  <a:schemeClr val="dk1"/>
-                </a:solidFill>
-                <a:effectLst/>
-                <a:latin typeface="Nunito"/>
-                <a:ea typeface="Nunito"/>
-                <a:cs typeface="Nunito"/>
-                <a:sym typeface="Nunito"/>
-              </a:rPr>
-              <a:t>Los </a:t>
-            </a:r>
-            <a:r>
-              <a:rPr lang="es-ES" sz="1200" b="0" i="0" u="none" strike="noStrike" cap="none" dirty="0" err="1">
-                <a:solidFill>
-                  <a:schemeClr val="dk1"/>
-                </a:solidFill>
-                <a:effectLst/>
-                <a:latin typeface="Nunito"/>
-                <a:ea typeface="Nunito"/>
-                <a:cs typeface="Nunito"/>
-                <a:sym typeface="Nunito"/>
-              </a:rPr>
-              <a:t>Runbooks</a:t>
-            </a:r>
-            <a:r>
-              <a:rPr lang="es-ES" sz="1200" b="0" i="0" u="none" strike="noStrike" cap="none" dirty="0">
-                <a:solidFill>
-                  <a:schemeClr val="dk1"/>
-                </a:solidFill>
-                <a:effectLst/>
-                <a:latin typeface="Nunito"/>
-                <a:ea typeface="Nunito"/>
-                <a:cs typeface="Nunito"/>
-                <a:sym typeface="Nunito"/>
-              </a:rPr>
-              <a:t> permiten controlar la creación, implementación, supervisión y el mantenimiento de los recursos en Azure y aplicaciones externas. También permiten controlar la ejecución de los mismos, dejando a disposición la posibilidad de ejecutar los </a:t>
-            </a:r>
-            <a:r>
-              <a:rPr lang="es-ES" sz="1200" b="0" i="0" u="none" strike="noStrike" cap="none" dirty="0" err="1">
-                <a:solidFill>
-                  <a:schemeClr val="dk1"/>
-                </a:solidFill>
-                <a:effectLst/>
-                <a:latin typeface="Nunito"/>
-                <a:ea typeface="Nunito"/>
-                <a:cs typeface="Nunito"/>
-                <a:sym typeface="Nunito"/>
-              </a:rPr>
-              <a:t>Runbooks</a:t>
-            </a:r>
-            <a:r>
-              <a:rPr lang="es-ES" sz="1200" b="0" i="0" u="none" strike="noStrike" cap="none" dirty="0">
-                <a:solidFill>
-                  <a:schemeClr val="dk1"/>
-                </a:solidFill>
-                <a:effectLst/>
-                <a:latin typeface="Nunito"/>
-                <a:ea typeface="Nunito"/>
-                <a:cs typeface="Nunito"/>
-                <a:sym typeface="Nunito"/>
-              </a:rPr>
-              <a:t> de forma programada.</a:t>
-            </a:r>
-          </a:p>
-          <a:p>
-            <a:pPr marL="0" lvl="0" indent="0">
-              <a:spcBef>
-                <a:spcPts val="0"/>
-              </a:spcBef>
-              <a:spcAft>
-                <a:spcPts val="0"/>
-              </a:spcAft>
-              <a:buNone/>
-            </a:pPr>
-            <a:r>
-              <a:rPr lang="es-ES" sz="1200" b="0" i="0" u="none" strike="noStrike" cap="none" dirty="0">
-                <a:solidFill>
-                  <a:schemeClr val="dk1"/>
-                </a:solidFill>
-                <a:effectLst/>
-                <a:latin typeface="Nunito"/>
-                <a:sym typeface="Nunito"/>
-              </a:rPr>
-              <a:t>Galería de </a:t>
-            </a:r>
-            <a:r>
-              <a:rPr lang="es-ES" sz="1200" b="0" i="0" u="none" strike="noStrike" cap="none" dirty="0" err="1">
-                <a:solidFill>
-                  <a:schemeClr val="dk1"/>
-                </a:solidFill>
-                <a:effectLst/>
-                <a:latin typeface="Nunito"/>
-                <a:sym typeface="Nunito"/>
-              </a:rPr>
-              <a:t>Runbooks</a:t>
-            </a:r>
-            <a:r>
-              <a:rPr lang="es-ES" sz="1200" b="0" i="0" u="none" strike="noStrike" cap="none" dirty="0">
-                <a:solidFill>
-                  <a:schemeClr val="dk1"/>
-                </a:solidFill>
-                <a:effectLst/>
-                <a:latin typeface="Nunito"/>
-                <a:sym typeface="Nunito"/>
-              </a:rPr>
-              <a:t> alimentado por la comunidad.</a:t>
-            </a:r>
-            <a:endParaRPr lang="es-ES" dirty="0"/>
+              <a:rPr lang="es-ES" sz="1200" i="0" dirty="0"/>
+              <a:t>Plataforma de administración basada en  PowerShell que permite administrar la infraestructura de desarrollo y TI con configuración como código.</a:t>
+            </a:r>
+            <a:endParaRPr lang="en-US" sz="1200" i="0" dirty="0"/>
           </a:p>
         </p:txBody>
       </p:sp>
@@ -6613,7 +6719,7 @@
           <a:p>
             <a:fld id="{034BFA8B-862A-E743-A9E6-9B9C0E234B15}" type="slidenum">
               <a:rPr lang="en-US" smtClean="0"/>
-              <a:t>27</a:t>
+              <a:t>26</a:t>
             </a:fld>
             <a:endParaRPr lang="en-US"/>
           </a:p>
@@ -6622,7 +6728,7 @@
     </p:spTree>
     <p:extLst>
       <p:ext uri="{BB962C8B-B14F-4D97-AF65-F5344CB8AC3E}">
-        <p14:creationId xmlns:p14="http://schemas.microsoft.com/office/powerpoint/2010/main" val="3195424488"/>
+        <p14:creationId xmlns:p14="http://schemas.microsoft.com/office/powerpoint/2010/main" val="4190936145"/>
       </p:ext>
     </p:extLst>
   </p:cSld>
@@ -10856,7 +10962,7 @@
           <a:p>
             <a:fld id="{C764DE79-268F-4C1A-8933-263129D2AF90}" type="datetimeFigureOut">
               <a:rPr lang="en-US" dirty="0"/>
-              <a:t>11/8/2018</a:t>
+              <a:t>11/14/2018</a:t>
             </a:fld>
             <a:endParaRPr lang="en-US" dirty="0"/>
           </a:p>
@@ -15405,6 +15511,105 @@
       </p:grpSpPr>
       <p:sp>
         <p:nvSpPr>
+          <p:cNvPr id="3" name="Rectangle 2">
+            <a:extLst>
+              <a:ext uri="{FF2B5EF4-FFF2-40B4-BE49-F238E27FC236}">
+                <a16:creationId xmlns:a16="http://schemas.microsoft.com/office/drawing/2014/main" id="{79BB4AF5-4476-4A06-945C-CD0EF90E1FCE}"/>
+              </a:ext>
+            </a:extLst>
+          </p:cNvPr>
+          <p:cNvSpPr/>
+          <p:nvPr/>
+        </p:nvSpPr>
+        <p:spPr>
+          <a:xfrm>
+            <a:off x="358717" y="789585"/>
+            <a:ext cx="11833283" cy="4819396"/>
+          </a:xfrm>
+          <a:prstGeom prst="rect">
+            <a:avLst/>
+          </a:prstGeom>
+        </p:spPr>
+        <p:txBody>
+          <a:bodyPr wrap="square">
+            <a:spAutoFit/>
+          </a:bodyPr>
+          <a:lstStyle/>
+          <a:p>
+            <a:pPr>
+              <a:lnSpc>
+                <a:spcPct val="150000"/>
+              </a:lnSpc>
+            </a:pPr>
+            <a:r>
+              <a:rPr lang="en-US" sz="4200" dirty="0"/>
+              <a:t>&gt; ARM templates are a declarative way of describing your infrastructure.</a:t>
+            </a:r>
+          </a:p>
+          <a:p>
+            <a:pPr>
+              <a:lnSpc>
+                <a:spcPct val="150000"/>
+              </a:lnSpc>
+            </a:pPr>
+            <a:r>
+              <a:rPr lang="es-UY" sz="4200" dirty="0"/>
+              <a:t>&gt; </a:t>
+            </a:r>
+            <a:r>
+              <a:rPr lang="en-US" sz="4200" dirty="0"/>
+              <a:t>ARM templates are json files.</a:t>
+            </a:r>
+          </a:p>
+          <a:p>
+            <a:pPr>
+              <a:lnSpc>
+                <a:spcPct val="150000"/>
+              </a:lnSpc>
+            </a:pPr>
+            <a:r>
+              <a:rPr lang="es-UY" sz="4200" dirty="0"/>
+              <a:t>&gt; </a:t>
+            </a:r>
+            <a:r>
+              <a:rPr lang="en-US" sz="4200" dirty="0"/>
+              <a:t>Contain 4 sections: parameters, variables, resources and output</a:t>
+            </a:r>
+          </a:p>
+        </p:txBody>
+      </p:sp>
+    </p:spTree>
+    <p:extLst>
+      <p:ext uri="{BB962C8B-B14F-4D97-AF65-F5344CB8AC3E}">
+        <p14:creationId xmlns:p14="http://schemas.microsoft.com/office/powerpoint/2010/main" val="1068472824"/>
+      </p:ext>
+    </p:extLst>
+  </p:cSld>
+  <p:clrMapOvr>
+    <a:masterClrMapping/>
+  </p:clrMapOvr>
+</p:sld>
+</file>
+
+<file path=ppt/slides/slide23.xml><?xml version="1.0" encoding="utf-8"?>
+<p:sld xmlns:a="http://schemas.openxmlformats.org/drawingml/2006/main" xmlns:r="http://schemas.openxmlformats.org/officeDocument/2006/relationships" xmlns:p="http://schemas.openxmlformats.org/presentationml/2006/main">
+  <p:cSld>
+    <p:spTree>
+      <p:nvGrpSpPr>
+        <p:cNvPr id="1" name=""/>
+        <p:cNvGrpSpPr/>
+        <p:nvPr/>
+      </p:nvGrpSpPr>
+      <p:grpSpPr>
+        <a:xfrm>
+          <a:off x="0" y="0"/>
+          <a:ext cx="0" cy="0"/>
+          <a:chOff x="0" y="0"/>
+          <a:chExt cx="0" cy="0"/>
+        </a:xfrm>
+      </p:grpSpPr>
+      <p:sp>
+        <p:nvSpPr>
           <p:cNvPr id="2" name="Title 1"/>
           <p:cNvSpPr>
             <a:spLocks noGrp="1"/>
@@ -15471,7 +15676,7 @@
 </p:sld>
 </file>
 
-<file path=ppt/slides/slide23.xml><?xml version="1.0" encoding="utf-8"?>
+<file path=ppt/slides/slide24.xml><?xml version="1.0" encoding="utf-8"?>
 <p:sld xmlns:a="http://schemas.openxmlformats.org/drawingml/2006/main" xmlns:r="http://schemas.openxmlformats.org/officeDocument/2006/relationships" xmlns:p="http://schemas.openxmlformats.org/presentationml/2006/main">
   <p:cSld>
     <p:spTree>
@@ -15531,7 +15736,7 @@
 </p:sld>
 </file>
 
-<file path=ppt/slides/slide24.xml><?xml version="1.0" encoding="utf-8"?>
+<file path=ppt/slides/slide25.xml><?xml version="1.0" encoding="utf-8"?>
 <p:sld xmlns:a="http://schemas.openxmlformats.org/drawingml/2006/main" xmlns:r="http://schemas.openxmlformats.org/officeDocument/2006/relationships" xmlns:p="http://schemas.openxmlformats.org/presentationml/2006/main">
   <p:cSld>
     <p:spTree>
@@ -15591,7 +15796,7 @@
 </p:sld>
 </file>
 
-<file path=ppt/slides/slide25.xml><?xml version="1.0" encoding="utf-8"?>
+<file path=ppt/slides/slide26.xml><?xml version="1.0" encoding="utf-8"?>
 <p:sld xmlns:a="http://schemas.openxmlformats.org/drawingml/2006/main" xmlns:r="http://schemas.openxmlformats.org/officeDocument/2006/relationships" xmlns:p="http://schemas.openxmlformats.org/presentationml/2006/main">
   <p:cSld>
     <p:spTree>
@@ -15651,7 +15856,7 @@
 </p:sld>
 </file>
 
-<file path=ppt/slides/slide26.xml><?xml version="1.0" encoding="utf-8"?>
+<file path=ppt/slides/slide27.xml><?xml version="1.0" encoding="utf-8"?>
 <p:sld xmlns:a="http://schemas.openxmlformats.org/drawingml/2006/main" xmlns:r="http://schemas.openxmlformats.org/officeDocument/2006/relationships" xmlns:p="http://schemas.openxmlformats.org/presentationml/2006/main">
   <p:cSld>
     <p:spTree>
@@ -15753,7 +15958,7 @@
 </p:sld>
 </file>
 
-<file path=ppt/slides/slide27.xml><?xml version="1.0" encoding="utf-8"?>
+<file path=ppt/slides/slide28.xml><?xml version="1.0" encoding="utf-8"?>
 <p:sld xmlns:a="http://schemas.openxmlformats.org/drawingml/2006/main" xmlns:r="http://schemas.openxmlformats.org/officeDocument/2006/relationships" xmlns:p="http://schemas.openxmlformats.org/presentationml/2006/main">
   <p:cSld>
     <p:spTree>
@@ -15879,7 +16084,7 @@
 </p:sld>
 </file>
 
-<file path=ppt/slides/slide28.xml><?xml version="1.0" encoding="utf-8"?>
+<file path=ppt/slides/slide29.xml><?xml version="1.0" encoding="utf-8"?>
 <p:sld xmlns:a="http://schemas.openxmlformats.org/drawingml/2006/main" xmlns:r="http://schemas.openxmlformats.org/officeDocument/2006/relationships" xmlns:p="http://schemas.openxmlformats.org/presentationml/2006/main">
   <p:cSld>
     <p:spTree>
@@ -15939,7 +16144,197 @@
 </p:sld>
 </file>
 
-<file path=ppt/slides/slide29.xml><?xml version="1.0" encoding="utf-8"?>
+<file path=ppt/slides/slide3.xml><?xml version="1.0" encoding="utf-8"?>
+<p:sld xmlns:a="http://schemas.openxmlformats.org/drawingml/2006/main" xmlns:r="http://schemas.openxmlformats.org/officeDocument/2006/relationships" xmlns:p="http://schemas.openxmlformats.org/presentationml/2006/main">
+  <p:cSld>
+    <p:spTree>
+      <p:nvGrpSpPr>
+        <p:cNvPr id="1" name=""/>
+        <p:cNvGrpSpPr/>
+        <p:nvPr/>
+      </p:nvGrpSpPr>
+      <p:grpSpPr>
+        <a:xfrm>
+          <a:off x="0" y="0"/>
+          <a:ext cx="0" cy="0"/>
+          <a:chOff x="0" y="0"/>
+          <a:chExt cx="0" cy="0"/>
+        </a:xfrm>
+      </p:grpSpPr>
+      <p:sp>
+        <p:nvSpPr>
+          <p:cNvPr id="4" name="Shape 122">
+            <a:extLst>
+              <a:ext uri="{FF2B5EF4-FFF2-40B4-BE49-F238E27FC236}">
+                <a16:creationId xmlns:a16="http://schemas.microsoft.com/office/drawing/2014/main" id="{8AC8AE15-05C9-47B3-905A-7C6947608D74}"/>
+              </a:ext>
+            </a:extLst>
+          </p:cNvPr>
+          <p:cNvSpPr txBox="1"/>
+          <p:nvPr/>
+        </p:nvSpPr>
+        <p:spPr>
+          <a:xfrm>
+            <a:off x="884126" y="650556"/>
+            <a:ext cx="1542164" cy="1542246"/>
+          </a:xfrm>
+          <a:prstGeom prst="rect">
+            <a:avLst/>
+          </a:prstGeom>
+          <a:noFill/>
+          <a:ln>
+            <a:noFill/>
+          </a:ln>
+        </p:spPr>
+        <p:txBody>
+          <a:bodyPr spcFirstLastPara="1" wrap="square" lIns="91425" tIns="45700" rIns="91425" bIns="45700" anchor="t" anchorCtr="0">
+            <a:noAutofit/>
+          </a:bodyPr>
+          <a:lstStyle/>
+          <a:p>
+            <a:pPr marL="0" marR="0" lvl="0" indent="0" algn="ctr" rtl="0">
+              <a:spcBef>
+                <a:spcPts val="0"/>
+              </a:spcBef>
+              <a:spcAft>
+                <a:spcPts val="0"/>
+              </a:spcAft>
+              <a:buNone/>
+            </a:pPr>
+            <a:r>
+              <a:rPr lang="en-US" sz="9600" dirty="0">
+                <a:ea typeface="Nunito"/>
+                <a:cs typeface="Nunito"/>
+                <a:sym typeface="Nunito"/>
+              </a:rPr>
+              <a:t>“</a:t>
+            </a:r>
+            <a:endParaRPr sz="9600" dirty="0">
+              <a:ea typeface="Nunito"/>
+              <a:cs typeface="Nunito"/>
+              <a:sym typeface="Nunito"/>
+            </a:endParaRPr>
+          </a:p>
+        </p:txBody>
+      </p:sp>
+      <p:sp>
+        <p:nvSpPr>
+          <p:cNvPr id="5" name="Shape 123">
+            <a:extLst>
+              <a:ext uri="{FF2B5EF4-FFF2-40B4-BE49-F238E27FC236}">
+                <a16:creationId xmlns:a16="http://schemas.microsoft.com/office/drawing/2014/main" id="{0C52471C-CA3F-48B6-9B81-049A46837C5C}"/>
+              </a:ext>
+            </a:extLst>
+          </p:cNvPr>
+          <p:cNvSpPr txBox="1"/>
+          <p:nvPr/>
+        </p:nvSpPr>
+        <p:spPr>
+          <a:xfrm>
+            <a:off x="1967339" y="1099138"/>
+            <a:ext cx="8257322" cy="3455604"/>
+          </a:xfrm>
+          <a:prstGeom prst="rect">
+            <a:avLst/>
+          </a:prstGeom>
+          <a:noFill/>
+          <a:ln>
+            <a:noFill/>
+          </a:ln>
+        </p:spPr>
+        <p:txBody>
+          <a:bodyPr spcFirstLastPara="1" wrap="square" lIns="91425" tIns="45700" rIns="91425" bIns="45700" anchor="t" anchorCtr="0">
+            <a:noAutofit/>
+          </a:bodyPr>
+          <a:lstStyle/>
+          <a:p>
+            <a:pPr lvl="0" algn="ctr"/>
+            <a:r>
+              <a:rPr lang="en-US" sz="4400" dirty="0">
+                <a:ea typeface="Nunito"/>
+                <a:cs typeface="Nunito"/>
+                <a:sym typeface="Nunito"/>
+              </a:rPr>
+              <a:t>Infrastructure as Code is a process of managing and provisioning computing infrastructure with some declarative approach while setting their configuration using definition files.</a:t>
+            </a:r>
+            <a:endParaRPr sz="4400" dirty="0">
+              <a:ea typeface="Nunito"/>
+              <a:cs typeface="Nunito"/>
+              <a:sym typeface="Nunito"/>
+            </a:endParaRPr>
+          </a:p>
+        </p:txBody>
+      </p:sp>
+      <p:sp>
+        <p:nvSpPr>
+          <p:cNvPr id="6" name="Shape 122">
+            <a:extLst>
+              <a:ext uri="{FF2B5EF4-FFF2-40B4-BE49-F238E27FC236}">
+                <a16:creationId xmlns:a16="http://schemas.microsoft.com/office/drawing/2014/main" id="{4BAFB3E4-86E1-4D3E-9019-14A32BE87AE4}"/>
+              </a:ext>
+            </a:extLst>
+          </p:cNvPr>
+          <p:cNvSpPr txBox="1"/>
+          <p:nvPr/>
+        </p:nvSpPr>
+        <p:spPr>
+          <a:xfrm flipV="1">
+            <a:off x="7542079" y="4263973"/>
+            <a:ext cx="1654175" cy="1494889"/>
+          </a:xfrm>
+          <a:prstGeom prst="rect">
+            <a:avLst/>
+          </a:prstGeom>
+          <a:noFill/>
+          <a:ln>
+            <a:noFill/>
+          </a:ln>
+        </p:spPr>
+        <p:txBody>
+          <a:bodyPr spcFirstLastPara="1" wrap="square" lIns="91425" tIns="45700" rIns="91425" bIns="45700" anchor="t" anchorCtr="0">
+            <a:noAutofit/>
+          </a:bodyPr>
+          <a:lstStyle/>
+          <a:p>
+            <a:pPr marL="0" marR="0" lvl="0" indent="0" algn="ctr" rtl="0">
+              <a:spcBef>
+                <a:spcPts val="0"/>
+              </a:spcBef>
+              <a:spcAft>
+                <a:spcPts val="0"/>
+              </a:spcAft>
+              <a:buNone/>
+            </a:pPr>
+            <a:r>
+              <a:rPr lang="en-US" sz="9600" dirty="0">
+                <a:ea typeface="Nunito"/>
+                <a:cs typeface="Nunito"/>
+                <a:sym typeface="Nunito"/>
+              </a:rPr>
+              <a:t>“</a:t>
+            </a:r>
+            <a:endParaRPr sz="9600" dirty="0">
+              <a:ea typeface="Nunito"/>
+              <a:cs typeface="Nunito"/>
+              <a:sym typeface="Nunito"/>
+            </a:endParaRPr>
+          </a:p>
+        </p:txBody>
+      </p:sp>
+    </p:spTree>
+    <p:extLst>
+      <p:ext uri="{BB962C8B-B14F-4D97-AF65-F5344CB8AC3E}">
+        <p14:creationId xmlns:p14="http://schemas.microsoft.com/office/powerpoint/2010/main" val="11614181"/>
+      </p:ext>
+    </p:extLst>
+  </p:cSld>
+  <p:clrMapOvr>
+    <a:masterClrMapping/>
+  </p:clrMapOvr>
+</p:sld>
+</file>
+
+<file path=ppt/slides/slide30.xml><?xml version="1.0" encoding="utf-8"?>
 <p:sld xmlns:a="http://schemas.openxmlformats.org/drawingml/2006/main" xmlns:r="http://schemas.openxmlformats.org/officeDocument/2006/relationships" xmlns:p="http://schemas.openxmlformats.org/presentationml/2006/main">
   <p:cSld>
     <p:spTree>
@@ -17047,197 +17442,7 @@
 </p:sld>
 </file>
 
-<file path=ppt/slides/slide3.xml><?xml version="1.0" encoding="utf-8"?>
-<p:sld xmlns:a="http://schemas.openxmlformats.org/drawingml/2006/main" xmlns:r="http://schemas.openxmlformats.org/officeDocument/2006/relationships" xmlns:p="http://schemas.openxmlformats.org/presentationml/2006/main">
-  <p:cSld>
-    <p:spTree>
-      <p:nvGrpSpPr>
-        <p:cNvPr id="1" name=""/>
-        <p:cNvGrpSpPr/>
-        <p:nvPr/>
-      </p:nvGrpSpPr>
-      <p:grpSpPr>
-        <a:xfrm>
-          <a:off x="0" y="0"/>
-          <a:ext cx="0" cy="0"/>
-          <a:chOff x="0" y="0"/>
-          <a:chExt cx="0" cy="0"/>
-        </a:xfrm>
-      </p:grpSpPr>
-      <p:sp>
-        <p:nvSpPr>
-          <p:cNvPr id="4" name="Shape 122">
-            <a:extLst>
-              <a:ext uri="{FF2B5EF4-FFF2-40B4-BE49-F238E27FC236}">
-                <a16:creationId xmlns:a16="http://schemas.microsoft.com/office/drawing/2014/main" id="{8AC8AE15-05C9-47B3-905A-7C6947608D74}"/>
-              </a:ext>
-            </a:extLst>
-          </p:cNvPr>
-          <p:cNvSpPr txBox="1"/>
-          <p:nvPr/>
-        </p:nvSpPr>
-        <p:spPr>
-          <a:xfrm>
-            <a:off x="884126" y="650556"/>
-            <a:ext cx="1542164" cy="1542246"/>
-          </a:xfrm>
-          <a:prstGeom prst="rect">
-            <a:avLst/>
-          </a:prstGeom>
-          <a:noFill/>
-          <a:ln>
-            <a:noFill/>
-          </a:ln>
-        </p:spPr>
-        <p:txBody>
-          <a:bodyPr spcFirstLastPara="1" wrap="square" lIns="91425" tIns="45700" rIns="91425" bIns="45700" anchor="t" anchorCtr="0">
-            <a:noAutofit/>
-          </a:bodyPr>
-          <a:lstStyle/>
-          <a:p>
-            <a:pPr marL="0" marR="0" lvl="0" indent="0" algn="ctr" rtl="0">
-              <a:spcBef>
-                <a:spcPts val="0"/>
-              </a:spcBef>
-              <a:spcAft>
-                <a:spcPts val="0"/>
-              </a:spcAft>
-              <a:buNone/>
-            </a:pPr>
-            <a:r>
-              <a:rPr lang="en-US" sz="9600" dirty="0">
-                <a:ea typeface="Nunito"/>
-                <a:cs typeface="Nunito"/>
-                <a:sym typeface="Nunito"/>
-              </a:rPr>
-              <a:t>“</a:t>
-            </a:r>
-            <a:endParaRPr sz="9600" dirty="0">
-              <a:ea typeface="Nunito"/>
-              <a:cs typeface="Nunito"/>
-              <a:sym typeface="Nunito"/>
-            </a:endParaRPr>
-          </a:p>
-        </p:txBody>
-      </p:sp>
-      <p:sp>
-        <p:nvSpPr>
-          <p:cNvPr id="5" name="Shape 123">
-            <a:extLst>
-              <a:ext uri="{FF2B5EF4-FFF2-40B4-BE49-F238E27FC236}">
-                <a16:creationId xmlns:a16="http://schemas.microsoft.com/office/drawing/2014/main" id="{0C52471C-CA3F-48B6-9B81-049A46837C5C}"/>
-              </a:ext>
-            </a:extLst>
-          </p:cNvPr>
-          <p:cNvSpPr txBox="1"/>
-          <p:nvPr/>
-        </p:nvSpPr>
-        <p:spPr>
-          <a:xfrm>
-            <a:off x="1967339" y="1099138"/>
-            <a:ext cx="8257322" cy="3455604"/>
-          </a:xfrm>
-          <a:prstGeom prst="rect">
-            <a:avLst/>
-          </a:prstGeom>
-          <a:noFill/>
-          <a:ln>
-            <a:noFill/>
-          </a:ln>
-        </p:spPr>
-        <p:txBody>
-          <a:bodyPr spcFirstLastPara="1" wrap="square" lIns="91425" tIns="45700" rIns="91425" bIns="45700" anchor="t" anchorCtr="0">
-            <a:noAutofit/>
-          </a:bodyPr>
-          <a:lstStyle/>
-          <a:p>
-            <a:pPr lvl="0" algn="ctr"/>
-            <a:r>
-              <a:rPr lang="en-US" sz="4400" dirty="0">
-                <a:ea typeface="Nunito"/>
-                <a:cs typeface="Nunito"/>
-                <a:sym typeface="Nunito"/>
-              </a:rPr>
-              <a:t>Infrastructure as Code is a process of managing and provisioning computing infrastructure with some declarative approach while setting their configuration using definition files.</a:t>
-            </a:r>
-            <a:endParaRPr sz="4400" dirty="0">
-              <a:ea typeface="Nunito"/>
-              <a:cs typeface="Nunito"/>
-              <a:sym typeface="Nunito"/>
-            </a:endParaRPr>
-          </a:p>
-        </p:txBody>
-      </p:sp>
-      <p:sp>
-        <p:nvSpPr>
-          <p:cNvPr id="6" name="Shape 122">
-            <a:extLst>
-              <a:ext uri="{FF2B5EF4-FFF2-40B4-BE49-F238E27FC236}">
-                <a16:creationId xmlns:a16="http://schemas.microsoft.com/office/drawing/2014/main" id="{4BAFB3E4-86E1-4D3E-9019-14A32BE87AE4}"/>
-              </a:ext>
-            </a:extLst>
-          </p:cNvPr>
-          <p:cNvSpPr txBox="1"/>
-          <p:nvPr/>
-        </p:nvSpPr>
-        <p:spPr>
-          <a:xfrm flipV="1">
-            <a:off x="7542079" y="4263973"/>
-            <a:ext cx="1654175" cy="1494889"/>
-          </a:xfrm>
-          <a:prstGeom prst="rect">
-            <a:avLst/>
-          </a:prstGeom>
-          <a:noFill/>
-          <a:ln>
-            <a:noFill/>
-          </a:ln>
-        </p:spPr>
-        <p:txBody>
-          <a:bodyPr spcFirstLastPara="1" wrap="square" lIns="91425" tIns="45700" rIns="91425" bIns="45700" anchor="t" anchorCtr="0">
-            <a:noAutofit/>
-          </a:bodyPr>
-          <a:lstStyle/>
-          <a:p>
-            <a:pPr marL="0" marR="0" lvl="0" indent="0" algn="ctr" rtl="0">
-              <a:spcBef>
-                <a:spcPts val="0"/>
-              </a:spcBef>
-              <a:spcAft>
-                <a:spcPts val="0"/>
-              </a:spcAft>
-              <a:buNone/>
-            </a:pPr>
-            <a:r>
-              <a:rPr lang="en-US" sz="9600" dirty="0">
-                <a:ea typeface="Nunito"/>
-                <a:cs typeface="Nunito"/>
-                <a:sym typeface="Nunito"/>
-              </a:rPr>
-              <a:t>“</a:t>
-            </a:r>
-            <a:endParaRPr sz="9600" dirty="0">
-              <a:ea typeface="Nunito"/>
-              <a:cs typeface="Nunito"/>
-              <a:sym typeface="Nunito"/>
-            </a:endParaRPr>
-          </a:p>
-        </p:txBody>
-      </p:sp>
-    </p:spTree>
-    <p:extLst>
-      <p:ext uri="{BB962C8B-B14F-4D97-AF65-F5344CB8AC3E}">
-        <p14:creationId xmlns:p14="http://schemas.microsoft.com/office/powerpoint/2010/main" val="11614181"/>
-      </p:ext>
-    </p:extLst>
-  </p:cSld>
-  <p:clrMapOvr>
-    <a:masterClrMapping/>
-  </p:clrMapOvr>
-</p:sld>
-</file>
-
-<file path=ppt/slides/slide30.xml><?xml version="1.0" encoding="utf-8"?>
+<file path=ppt/slides/slide31.xml><?xml version="1.0" encoding="utf-8"?>
 <p:sld xmlns:a="http://schemas.openxmlformats.org/drawingml/2006/main" xmlns:r="http://schemas.openxmlformats.org/officeDocument/2006/relationships" xmlns:p="http://schemas.openxmlformats.org/presentationml/2006/main">
   <p:cSld>
     <p:bg>
@@ -17798,7 +18003,7 @@
 </p:sld>
 </file>
 
-<file path=ppt/slides/slide31.xml><?xml version="1.0" encoding="utf-8"?>
+<file path=ppt/slides/slide32.xml><?xml version="1.0" encoding="utf-8"?>
 <p:sld xmlns:a="http://schemas.openxmlformats.org/drawingml/2006/main" xmlns:r="http://schemas.openxmlformats.org/officeDocument/2006/relationships" xmlns:p="http://schemas.openxmlformats.org/presentationml/2006/main">
   <p:cSld>
     <p:spTree>

</xml_diff>